<commit_message>
Update PYTHON_8_Lists Part 1.pptx
</commit_message>
<xml_diff>
--- a/PYTHON_8_Lists Part 1.pptx
+++ b/PYTHON_8_Lists Part 1.pptx
@@ -296,7 +296,7 @@
           <a:p>
             <a:fld id="{D3853345-A581-455E-9661-1270F4F6E587}" type="datetimeFigureOut">
               <a:rPr lang="en-US" smtClean="0"/>
-              <a:t>6/23/2019</a:t>
+              <a:t>7/10/2019</a:t>
             </a:fld>
             <a:endParaRPr lang="en-US"/>
           </a:p>
@@ -499,7 +499,7 @@
           <a:p>
             <a:fld id="{D3853345-A581-455E-9661-1270F4F6E587}" type="datetimeFigureOut">
               <a:rPr lang="en-US" smtClean="0"/>
-              <a:t>6/23/2019</a:t>
+              <a:t>7/10/2019</a:t>
             </a:fld>
             <a:endParaRPr lang="en-US"/>
           </a:p>
@@ -707,7 +707,7 @@
           <a:p>
             <a:fld id="{D3853345-A581-455E-9661-1270F4F6E587}" type="datetimeFigureOut">
               <a:rPr lang="en-US" smtClean="0"/>
-              <a:t>6/23/2019</a:t>
+              <a:t>7/10/2019</a:t>
             </a:fld>
             <a:endParaRPr lang="en-US"/>
           </a:p>
@@ -905,7 +905,7 @@
           <a:p>
             <a:fld id="{D3853345-A581-455E-9661-1270F4F6E587}" type="datetimeFigureOut">
               <a:rPr lang="en-US" smtClean="0"/>
-              <a:t>6/23/2019</a:t>
+              <a:t>7/10/2019</a:t>
             </a:fld>
             <a:endParaRPr lang="en-US"/>
           </a:p>
@@ -1180,7 +1180,7 @@
           <a:p>
             <a:fld id="{D3853345-A581-455E-9661-1270F4F6E587}" type="datetimeFigureOut">
               <a:rPr lang="en-US" smtClean="0"/>
-              <a:t>6/23/2019</a:t>
+              <a:t>7/10/2019</a:t>
             </a:fld>
             <a:endParaRPr lang="en-US"/>
           </a:p>
@@ -1445,7 +1445,7 @@
           <a:p>
             <a:fld id="{D3853345-A581-455E-9661-1270F4F6E587}" type="datetimeFigureOut">
               <a:rPr lang="en-US" smtClean="0"/>
-              <a:t>6/23/2019</a:t>
+              <a:t>7/10/2019</a:t>
             </a:fld>
             <a:endParaRPr lang="en-US"/>
           </a:p>
@@ -1857,7 +1857,7 @@
           <a:p>
             <a:fld id="{D3853345-A581-455E-9661-1270F4F6E587}" type="datetimeFigureOut">
               <a:rPr lang="en-US" smtClean="0"/>
-              <a:t>6/23/2019</a:t>
+              <a:t>7/10/2019</a:t>
             </a:fld>
             <a:endParaRPr lang="en-US"/>
           </a:p>
@@ -1998,7 +1998,7 @@
           <a:p>
             <a:fld id="{D3853345-A581-455E-9661-1270F4F6E587}" type="datetimeFigureOut">
               <a:rPr lang="en-US" smtClean="0"/>
-              <a:t>6/23/2019</a:t>
+              <a:t>7/10/2019</a:t>
             </a:fld>
             <a:endParaRPr lang="en-US"/>
           </a:p>
@@ -2111,7 +2111,7 @@
           <a:p>
             <a:fld id="{D3853345-A581-455E-9661-1270F4F6E587}" type="datetimeFigureOut">
               <a:rPr lang="en-US" smtClean="0"/>
-              <a:t>6/23/2019</a:t>
+              <a:t>7/10/2019</a:t>
             </a:fld>
             <a:endParaRPr lang="en-US"/>
           </a:p>
@@ -2427,7 +2427,7 @@
           <a:p>
             <a:fld id="{D3853345-A581-455E-9661-1270F4F6E587}" type="datetimeFigureOut">
               <a:rPr lang="en-US" smtClean="0"/>
-              <a:t>6/23/2019</a:t>
+              <a:t>7/10/2019</a:t>
             </a:fld>
             <a:endParaRPr lang="en-US"/>
           </a:p>
@@ -2720,7 +2720,7 @@
           <a:p>
             <a:fld id="{D3853345-A581-455E-9661-1270F4F6E587}" type="datetimeFigureOut">
               <a:rPr lang="en-US" smtClean="0"/>
-              <a:t>6/23/2019</a:t>
+              <a:t>7/10/2019</a:t>
             </a:fld>
             <a:endParaRPr lang="en-US"/>
           </a:p>
@@ -2961,7 +2961,7 @@
           <a:p>
             <a:fld id="{D3853345-A581-455E-9661-1270F4F6E587}" type="datetimeFigureOut">
               <a:rPr lang="en-US" smtClean="0"/>
-              <a:t>6/23/2019</a:t>
+              <a:t>7/10/2019</a:t>
             </a:fld>
             <a:endParaRPr lang="en-US"/>
           </a:p>
@@ -3818,7 +3818,7 @@
             </a:r>
             <a:r>
               <a:rPr lang="en-US" b="1" dirty="0"/>
-              <a:t>append() </a:t>
+              <a:t>append( ) </a:t>
             </a:r>
           </a:p>
         </p:txBody>
@@ -3842,7 +3842,7 @@
         <p:spPr/>
         <p:txBody>
           <a:bodyPr>
-            <a:normAutofit lnSpcReduction="10000"/>
+            <a:normAutofit fontScale="92500" lnSpcReduction="10000"/>
           </a:bodyPr>
           <a:lstStyle/>
           <a:p>
@@ -3851,7 +3851,15 @@
             </a:pPr>
             <a:r>
               <a:rPr lang="en-US" dirty="0"/>
-              <a:t>• We can use append() to create a list of numbers (using a loop to control how many) </a:t>
+              <a:t>• We can use </a:t>
+            </a:r>
+            <a:r>
+              <a:rPr lang="en-US" b="1" dirty="0"/>
+              <a:t>append( ) </a:t>
+            </a:r>
+            <a:r>
+              <a:rPr lang="en-US" dirty="0"/>
+              <a:t>to create a list of numbers (using a loop to control how many) </a:t>
             </a:r>
           </a:p>
           <a:p>
@@ -4007,6 +4015,23 @@
             <a:r>
               <a:rPr lang="en-US" dirty="0"/>
               <a:t>        count += 1</a:t>
+            </a:r>
+          </a:p>
+          <a:p>
+            <a:pPr marL="0" indent="0">
+              <a:buNone/>
+            </a:pPr>
+            <a:r>
+              <a:rPr lang="en-US" dirty="0">
+                <a:solidFill>
+                  <a:srgbClr val="FF0000"/>
+                </a:solidFill>
+              </a:rPr>
+              <a:t>print</a:t>
+            </a:r>
+            <a:r>
+              <a:rPr lang="en-US" dirty="0"/>
+              <a:t> (values)</a:t>
             </a:r>
           </a:p>
         </p:txBody>
@@ -4639,16 +4664,16 @@
             </a:pPr>
             <a:r>
               <a:rPr lang="en-US" dirty="0"/>
-              <a:t>     –.append() </a:t>
-            </a:r>
-          </a:p>
-          <a:p>
-            <a:pPr marL="0" indent="0">
-              <a:buNone/>
-            </a:pPr>
-            <a:r>
-              <a:rPr lang="en-US" dirty="0"/>
-              <a:t>     –.remove()</a:t>
+              <a:t>     – .append() </a:t>
+            </a:r>
+          </a:p>
+          <a:p>
+            <a:pPr marL="0" indent="0">
+              <a:buNone/>
+            </a:pPr>
+            <a:r>
+              <a:rPr lang="en-US" dirty="0"/>
+              <a:t>     – .remove()</a:t>
             </a:r>
           </a:p>
           <a:p>
@@ -5475,8 +5500,8 @@
         </p:nvSpPr>
         <p:spPr>
           <a:xfrm>
-            <a:off x="6745457" y="3537969"/>
-            <a:ext cx="1533379" cy="646331"/>
+            <a:off x="6618847" y="3429000"/>
+            <a:ext cx="2651761" cy="954107"/>
           </a:xfrm>
           <a:prstGeom prst="rect">
             <a:avLst/>
@@ -5495,7 +5520,7 @@
           <a:lstStyle/>
           <a:p>
             <a:r>
-              <a:rPr lang="en-US" b="1" dirty="0">
+              <a:rPr lang="en-US" sz="2800" b="1" dirty="0">
                 <a:solidFill>
                   <a:srgbClr val="0070C0"/>
                 </a:solidFill>
@@ -5652,7 +5677,7 @@
         <p:spPr>
           <a:xfrm>
             <a:off x="8370276" y="2440744"/>
-            <a:ext cx="1983546" cy="646331"/>
+            <a:ext cx="1983546" cy="830997"/>
           </a:xfrm>
           <a:prstGeom prst="rect">
             <a:avLst/>
@@ -5671,7 +5696,7 @@
           <a:lstStyle/>
           <a:p>
             <a:r>
-              <a:rPr lang="en-US" b="1" dirty="0">
+              <a:rPr lang="en-US" sz="2400" b="1" dirty="0">
                 <a:solidFill>
                   <a:srgbClr val="0070C0"/>
                 </a:solidFill>
@@ -7047,7 +7072,7 @@
             </a:r>
             <a:r>
               <a:rPr lang="en-US" dirty="0"/>
-              <a:t>([2, 0, 1, 8]) </a:t>
+              <a:t>([2, 0, 1, 9]) </a:t>
             </a:r>
           </a:p>
           <a:p>
@@ -8684,8 +8709,12 @@
           <a:lstStyle/>
           <a:p>
             <a:r>
-              <a:rPr lang="en-US" dirty="0"/>
-              <a:t>HW 06: Updated Grocery List </a:t>
+              <a:rPr lang="en-US"/>
+              <a:t>HW 08: </a:t>
+            </a:r>
+            <a:r>
+              <a:rPr lang="en-US" dirty="0"/>
+              <a:t>Updated Grocery List </a:t>
             </a:r>
           </a:p>
         </p:txBody>
@@ -9180,7 +9209,11 @@
           <a:lstStyle/>
           <a:p>
             <a:r>
-              <a:rPr lang="en-US" b="1" dirty="0"/>
+              <a:rPr lang="en-US" b="1" dirty="0">
+                <a:solidFill>
+                  <a:srgbClr val="0070C0"/>
+                </a:solidFill>
+              </a:rPr>
               <a:t>Using Lists </a:t>
             </a:r>
           </a:p>
@@ -9204,14 +9237,16 @@
         </p:nvSpPr>
         <p:spPr/>
         <p:txBody>
-          <a:bodyPr/>
-          <a:lstStyle/>
-          <a:p>
-            <a:pPr marL="0" indent="0">
-              <a:buNone/>
-            </a:pPr>
-            <a:r>
-              <a:rPr lang="en-US" dirty="0"/>
+          <a:bodyPr>
+            <a:normAutofit fontScale="92500" lnSpcReduction="20000"/>
+          </a:bodyPr>
+          <a:lstStyle/>
+          <a:p>
+            <a:pPr marL="0" indent="0">
+              <a:buNone/>
+            </a:pPr>
+            <a:r>
+              <a:rPr lang="en-US" sz="3200" dirty="0"/>
               <a:t>• We need an easy way to hold individual data items without needing to make lots of variables</a:t>
             </a:r>
           </a:p>
@@ -9220,7 +9255,7 @@
               <a:buNone/>
             </a:pPr>
             <a:r>
-              <a:rPr lang="en-US" dirty="0"/>
+              <a:rPr lang="en-US" sz="3200" dirty="0"/>
               <a:t>   –Making num1, num2, ..., num99, num100 is time-consuming and  </a:t>
             </a:r>
           </a:p>
@@ -9229,7 +9264,7 @@
               <a:buNone/>
             </a:pPr>
             <a:r>
-              <a:rPr lang="en-US" dirty="0"/>
+              <a:rPr lang="en-US" sz="3200" dirty="0"/>
               <a:t>     impractical</a:t>
             </a:r>
           </a:p>
@@ -9237,14 +9272,14 @@
             <a:pPr marL="0" indent="0">
               <a:buNone/>
             </a:pPr>
-            <a:endParaRPr lang="en-US" dirty="0"/>
-          </a:p>
-          <a:p>
-            <a:pPr marL="0" indent="0">
-              <a:buNone/>
-            </a:pPr>
-            <a:r>
-              <a:rPr lang="en-US" dirty="0"/>
+            <a:endParaRPr lang="en-US" sz="3200" dirty="0"/>
+          </a:p>
+          <a:p>
+            <a:pPr marL="0" indent="0">
+              <a:buNone/>
+            </a:pPr>
+            <a:r>
+              <a:rPr lang="en-US" sz="3200" dirty="0"/>
               <a:t>• Instead, we can use a list to hold our data </a:t>
             </a:r>
           </a:p>
@@ -9253,7 +9288,7 @@
               <a:buNone/>
             </a:pPr>
             <a:r>
-              <a:rPr lang="en-US" dirty="0"/>
+              <a:rPr lang="en-US" sz="3200" dirty="0"/>
               <a:t>    –A list is a data structure: something that holds multiple pieces of</a:t>
             </a:r>
           </a:p>
@@ -9262,7 +9297,7 @@
               <a:buNone/>
             </a:pPr>
             <a:r>
-              <a:rPr lang="en-US" dirty="0"/>
+              <a:rPr lang="en-US" sz="3200" dirty="0"/>
               <a:t>      data in one structure</a:t>
             </a:r>
           </a:p>
@@ -9326,7 +9361,11 @@
           <a:lstStyle/>
           <a:p>
             <a:r>
-              <a:rPr lang="en-US" b="1" dirty="0"/>
+              <a:rPr lang="en-US" b="1" dirty="0">
+                <a:solidFill>
+                  <a:srgbClr val="0070C0"/>
+                </a:solidFill>
+              </a:rPr>
               <a:t>Lists vs Individual Variables </a:t>
             </a:r>
           </a:p>
@@ -9350,14 +9389,16 @@
         </p:nvSpPr>
         <p:spPr/>
         <p:txBody>
-          <a:bodyPr/>
-          <a:lstStyle/>
-          <a:p>
-            <a:pPr marL="0" indent="0">
-              <a:buNone/>
-            </a:pPr>
-            <a:r>
-              <a:rPr lang="en-US" dirty="0"/>
+          <a:bodyPr>
+            <a:normAutofit lnSpcReduction="10000"/>
+          </a:bodyPr>
+          <a:lstStyle/>
+          <a:p>
+            <a:pPr marL="0" indent="0">
+              <a:buNone/>
+            </a:pPr>
+            <a:r>
+              <a:rPr lang="en-US" sz="3600" dirty="0"/>
               <a:t>• Individual variables are like sticky notes</a:t>
             </a:r>
           </a:p>
@@ -9366,7 +9407,7 @@
               <a:buNone/>
             </a:pPr>
             <a:r>
-              <a:rPr lang="en-US" dirty="0"/>
+              <a:rPr lang="en-US" sz="3600" dirty="0"/>
               <a:t> –Works best when you only need a few</a:t>
             </a:r>
           </a:p>
@@ -9375,7 +9416,7 @@
               <a:buNone/>
             </a:pPr>
             <a:r>
-              <a:rPr lang="en-US" dirty="0"/>
+              <a:rPr lang="en-US" sz="3600" dirty="0"/>
               <a:t> –Good for storing different “pieces” of info</a:t>
             </a:r>
           </a:p>
@@ -9383,14 +9424,14 @@
             <a:pPr marL="0" indent="0">
               <a:buNone/>
             </a:pPr>
-            <a:endParaRPr lang="en-US" dirty="0"/>
-          </a:p>
-          <a:p>
-            <a:pPr marL="0" indent="0">
-              <a:buNone/>
-            </a:pPr>
-            <a:r>
-              <a:rPr lang="en-US" dirty="0"/>
+            <a:endParaRPr lang="en-US" sz="3600" dirty="0"/>
+          </a:p>
+          <a:p>
+            <a:pPr marL="0" indent="0">
+              <a:buNone/>
+            </a:pPr>
+            <a:r>
+              <a:rPr lang="en-US" sz="3600" dirty="0"/>
               <a:t>• Lists are like a checklist written on a single piece of paper </a:t>
             </a:r>
           </a:p>
@@ -9399,7 +9440,7 @@
               <a:buNone/>
             </a:pPr>
             <a:r>
-              <a:rPr lang="en-US" dirty="0"/>
+              <a:rPr lang="en-US" sz="3600" dirty="0"/>
               <a:t>–Best for storing a lot of related information in one place</a:t>
             </a:r>
           </a:p>
@@ -9462,85 +9503,145 @@
         </p:nvSpPr>
         <p:spPr/>
         <p:txBody>
+          <a:bodyPr>
+            <a:normAutofit/>
+          </a:bodyPr>
+          <a:lstStyle/>
+          <a:p>
+            <a:r>
+              <a:rPr lang="en-US" sz="4800" b="1" dirty="0">
+                <a:solidFill>
+                  <a:srgbClr val="0070C0"/>
+                </a:solidFill>
+              </a:rPr>
+              <a:t>Properties of a List </a:t>
+            </a:r>
+          </a:p>
+        </p:txBody>
+      </p:sp>
+      <p:sp>
+        <p:nvSpPr>
+          <p:cNvPr id="3" name="Content Placeholder 2">
+            <a:extLst>
+              <a:ext uri="{FF2B5EF4-FFF2-40B4-BE49-F238E27FC236}">
+                <a16:creationId xmlns:a16="http://schemas.microsoft.com/office/drawing/2014/main" id="{E12F18CE-C4A0-49A5-A41B-AB36D14A16DB}"/>
+              </a:ext>
+            </a:extLst>
+          </p:cNvPr>
+          <p:cNvSpPr>
+            <a:spLocks noGrp="1"/>
+          </p:cNvSpPr>
+          <p:nvPr>
+            <p:ph idx="1"/>
+          </p:nvPr>
+        </p:nvSpPr>
+        <p:spPr/>
+        <p:txBody>
           <a:bodyPr/>
           <a:lstStyle/>
           <a:p>
-            <a:r>
-              <a:rPr lang="en-US" b="1" dirty="0"/>
-              <a:t>Properties of a List </a:t>
-            </a:r>
-          </a:p>
-        </p:txBody>
-      </p:sp>
-      <p:sp>
-        <p:nvSpPr>
-          <p:cNvPr id="3" name="Content Placeholder 2">
-            <a:extLst>
-              <a:ext uri="{FF2B5EF4-FFF2-40B4-BE49-F238E27FC236}">
-                <a16:creationId xmlns:a16="http://schemas.microsoft.com/office/drawing/2014/main" id="{E12F18CE-C4A0-49A5-A41B-AB36D14A16DB}"/>
-              </a:ext>
-            </a:extLst>
-          </p:cNvPr>
-          <p:cNvSpPr>
-            <a:spLocks noGrp="1"/>
-          </p:cNvSpPr>
-          <p:nvPr>
-            <p:ph idx="1"/>
-          </p:nvPr>
-        </p:nvSpPr>
-        <p:spPr/>
-        <p:txBody>
-          <a:bodyPr/>
-          <a:lstStyle/>
-          <a:p>
-            <a:pPr marL="0" indent="0">
-              <a:buNone/>
-            </a:pPr>
-            <a:r>
-              <a:rPr lang="en-US" dirty="0"/>
-              <a:t>• Heterogeneous (multiple data types!)</a:t>
-            </a:r>
-          </a:p>
-          <a:p>
-            <a:pPr marL="0" indent="0">
-              <a:buNone/>
-            </a:pPr>
-            <a:r>
-              <a:rPr lang="en-US" dirty="0"/>
-              <a:t>• Contiguous (all together in memory) </a:t>
-            </a:r>
-          </a:p>
-          <a:p>
-            <a:pPr marL="0" indent="0">
-              <a:buNone/>
-            </a:pPr>
-            <a:r>
-              <a:rPr lang="en-US" dirty="0"/>
-              <a:t>• Ordered (remain in the order they were set in)</a:t>
-            </a:r>
-          </a:p>
-          <a:p>
-            <a:pPr marL="0" indent="0">
-              <a:buNone/>
-            </a:pPr>
-            <a:endParaRPr lang="en-US" dirty="0"/>
-          </a:p>
-          <a:p>
-            <a:pPr marL="0" indent="0">
-              <a:buNone/>
-            </a:pPr>
-            <a:r>
-              <a:rPr lang="en-US" dirty="0"/>
-              <a:t>• Have instant (“random”) access to any element </a:t>
-            </a:r>
-          </a:p>
-          <a:p>
-            <a:pPr marL="0" indent="0">
-              <a:buNone/>
-            </a:pPr>
-            <a:r>
-              <a:rPr lang="en-US" dirty="0"/>
-              <a:t>• Are “mutable sequences of arbitrary objects” (Can be modified)</a:t>
+            <a:pPr marL="0" indent="0">
+              <a:buNone/>
+            </a:pPr>
+            <a:r>
+              <a:rPr lang="en-US" sz="3600" dirty="0"/>
+              <a:t>• </a:t>
+            </a:r>
+            <a:r>
+              <a:rPr lang="en-US" sz="3600" dirty="0">
+                <a:solidFill>
+                  <a:srgbClr val="00B050"/>
+                </a:solidFill>
+              </a:rPr>
+              <a:t>Heterogeneous</a:t>
+            </a:r>
+            <a:r>
+              <a:rPr lang="en-US" sz="3600" dirty="0"/>
+              <a:t> (multiple data types!)</a:t>
+            </a:r>
+          </a:p>
+          <a:p>
+            <a:pPr marL="0" indent="0">
+              <a:buNone/>
+            </a:pPr>
+            <a:r>
+              <a:rPr lang="en-US" sz="3600" dirty="0"/>
+              <a:t>• </a:t>
+            </a:r>
+            <a:r>
+              <a:rPr lang="en-US" sz="3600" dirty="0">
+                <a:solidFill>
+                  <a:srgbClr val="00B050"/>
+                </a:solidFill>
+              </a:rPr>
+              <a:t>Contiguous</a:t>
+            </a:r>
+            <a:r>
+              <a:rPr lang="en-US" sz="3600" dirty="0"/>
+              <a:t> (all together in memory, sharing a common border) </a:t>
+            </a:r>
+          </a:p>
+          <a:p>
+            <a:pPr marL="0" indent="0">
+              <a:buNone/>
+            </a:pPr>
+            <a:r>
+              <a:rPr lang="en-US" sz="3600" dirty="0"/>
+              <a:t>• </a:t>
+            </a:r>
+            <a:r>
+              <a:rPr lang="en-US" sz="3600" dirty="0">
+                <a:solidFill>
+                  <a:srgbClr val="00B050"/>
+                </a:solidFill>
+              </a:rPr>
+              <a:t>Ordered</a:t>
+            </a:r>
+            <a:r>
+              <a:rPr lang="en-US" sz="3600" dirty="0"/>
+              <a:t> (remain in the order they were set in)</a:t>
+            </a:r>
+          </a:p>
+          <a:p>
+            <a:pPr marL="0" indent="0">
+              <a:buNone/>
+            </a:pPr>
+            <a:r>
+              <a:rPr lang="en-US" sz="3600" dirty="0"/>
+              <a:t>• Have instant (“</a:t>
+            </a:r>
+            <a:r>
+              <a:rPr lang="en-US" sz="3600" dirty="0">
+                <a:solidFill>
+                  <a:srgbClr val="00B050"/>
+                </a:solidFill>
+              </a:rPr>
+              <a:t>random</a:t>
+            </a:r>
+            <a:r>
+              <a:rPr lang="en-US" sz="3600" dirty="0"/>
+              <a:t>”) access to any element </a:t>
+            </a:r>
+          </a:p>
+          <a:p>
+            <a:pPr marL="0" indent="0">
+              <a:buNone/>
+            </a:pPr>
+            <a:r>
+              <a:rPr lang="en-US" sz="3600" dirty="0"/>
+              <a:t>• Are “</a:t>
+            </a:r>
+            <a:r>
+              <a:rPr lang="en-US" sz="3600" dirty="0">
+                <a:solidFill>
+                  <a:srgbClr val="00B050"/>
+                </a:solidFill>
+              </a:rPr>
+              <a:t>mutable sequences of arbitrary objects</a:t>
+            </a:r>
+            <a:r>
+              <a:rPr lang="en-US" sz="3600" dirty="0"/>
+              <a:t>” (Can be modified)</a:t>
             </a:r>
           </a:p>
           <a:p>

</xml_diff>